<commit_message>
Added Students Suspended, Previos 4 weeks table (actually looks at previous 4 weeks.  Updated and moved daily Enrollment and Attendence Table.
</commit_message>
<xml_diff>
--- a/Dashboards/KIPP Chicago Dashboard Charts 121115.pptx
+++ b/Dashboards/KIPP Chicago Dashboard Charts 121115.pptx
@@ -406,11 +406,11 @@
         </c:dLbls>
         <c:gapWidth val="150"/>
         <c:overlap val="100"/>
-        <c:axId val="2136460504"/>
-        <c:axId val="2136432696"/>
+        <c:axId val="2078743928"/>
+        <c:axId val="2078746840"/>
       </c:barChart>
       <c:catAx>
-        <c:axId val="2136460504"/>
+        <c:axId val="2078743928"/>
         <c:scaling>
           <c:orientation val="minMax"/>
         </c:scaling>
@@ -419,7 +419,7 @@
         <c:majorTickMark val="out"/>
         <c:minorTickMark val="none"/>
         <c:tickLblPos val="nextTo"/>
-        <c:crossAx val="2136432696"/>
+        <c:crossAx val="2078746840"/>
         <c:crosses val="autoZero"/>
         <c:auto val="1"/>
         <c:lblAlgn val="ctr"/>
@@ -427,7 +427,7 @@
         <c:noMultiLvlLbl val="0"/>
       </c:catAx>
       <c:valAx>
-        <c:axId val="2136432696"/>
+        <c:axId val="2078746840"/>
         <c:scaling>
           <c:orientation val="minMax"/>
         </c:scaling>
@@ -438,7 +438,7 @@
         <c:majorTickMark val="out"/>
         <c:minorTickMark val="none"/>
         <c:tickLblPos val="nextTo"/>
-        <c:crossAx val="2136460504"/>
+        <c:crossAx val="2078743928"/>
         <c:crosses val="autoZero"/>
         <c:crossBetween val="between"/>
       </c:valAx>
@@ -587,11 +587,11 @@
         </c:dLbls>
         <c:marker val="1"/>
         <c:smooth val="0"/>
-        <c:axId val="2136765144"/>
-        <c:axId val="2136768088"/>
+        <c:axId val="-2114504824"/>
+        <c:axId val="-2114490920"/>
       </c:lineChart>
       <c:catAx>
-        <c:axId val="2136765144"/>
+        <c:axId val="-2114504824"/>
         <c:scaling>
           <c:orientation val="minMax"/>
         </c:scaling>
@@ -600,7 +600,7 @@
         <c:majorTickMark val="out"/>
         <c:minorTickMark val="none"/>
         <c:tickLblPos val="nextTo"/>
-        <c:crossAx val="2136768088"/>
+        <c:crossAx val="-2114490920"/>
         <c:crosses val="autoZero"/>
         <c:auto val="1"/>
         <c:lblAlgn val="ctr"/>
@@ -608,7 +608,7 @@
         <c:noMultiLvlLbl val="0"/>
       </c:catAx>
       <c:valAx>
-        <c:axId val="2136768088"/>
+        <c:axId val="-2114490920"/>
         <c:scaling>
           <c:orientation val="minMax"/>
         </c:scaling>
@@ -619,7 +619,7 @@
         <c:majorTickMark val="out"/>
         <c:minorTickMark val="none"/>
         <c:tickLblPos val="nextTo"/>
-        <c:crossAx val="2136765144"/>
+        <c:crossAx val="-2114504824"/>
         <c:crosses val="autoZero"/>
         <c:crossBetween val="between"/>
         <c:majorUnit val="400000.0"/>
@@ -832,11 +832,11 @@
           <c:showBubbleSize val="0"/>
         </c:dLbls>
         <c:gapWidth val="75"/>
-        <c:axId val="2136282280"/>
-        <c:axId val="2136272600"/>
+        <c:axId val="-2114384408"/>
+        <c:axId val="-2114403016"/>
       </c:barChart>
       <c:catAx>
-        <c:axId val="2136282280"/>
+        <c:axId val="-2114384408"/>
         <c:scaling>
           <c:orientation val="minMax"/>
         </c:scaling>
@@ -845,7 +845,7 @@
         <c:majorTickMark val="none"/>
         <c:minorTickMark val="none"/>
         <c:tickLblPos val="nextTo"/>
-        <c:crossAx val="2136272600"/>
+        <c:crossAx val="-2114403016"/>
         <c:crosses val="autoZero"/>
         <c:auto val="1"/>
         <c:lblAlgn val="ctr"/>
@@ -853,7 +853,7 @@
         <c:noMultiLvlLbl val="0"/>
       </c:catAx>
       <c:valAx>
-        <c:axId val="2136272600"/>
+        <c:axId val="-2114403016"/>
         <c:scaling>
           <c:orientation val="minMax"/>
           <c:max val="1.0"/>
@@ -864,7 +864,7 @@
         <c:majorTickMark val="none"/>
         <c:minorTickMark val="none"/>
         <c:tickLblPos val="nextTo"/>
-        <c:crossAx val="2136282280"/>
+        <c:crossAx val="-2114384408"/>
         <c:crosses val="autoZero"/>
         <c:crossBetween val="between"/>
         <c:majorUnit val="0.2"/>
@@ -1078,11 +1078,11 @@
           <c:showBubbleSize val="0"/>
         </c:dLbls>
         <c:gapWidth val="75"/>
-        <c:axId val="2135298696"/>
-        <c:axId val="2135289016"/>
+        <c:axId val="-2115800776"/>
+        <c:axId val="-2115791256"/>
       </c:barChart>
       <c:catAx>
-        <c:axId val="2135298696"/>
+        <c:axId val="-2115800776"/>
         <c:scaling>
           <c:orientation val="minMax"/>
         </c:scaling>
@@ -1091,7 +1091,7 @@
         <c:majorTickMark val="none"/>
         <c:minorTickMark val="none"/>
         <c:tickLblPos val="nextTo"/>
-        <c:crossAx val="2135289016"/>
+        <c:crossAx val="-2115791256"/>
         <c:crosses val="autoZero"/>
         <c:auto val="1"/>
         <c:lblAlgn val="ctr"/>
@@ -1099,7 +1099,7 @@
         <c:noMultiLvlLbl val="0"/>
       </c:catAx>
       <c:valAx>
-        <c:axId val="2135289016"/>
+        <c:axId val="-2115791256"/>
         <c:scaling>
           <c:orientation val="minMax"/>
           <c:max val="1.0"/>
@@ -1110,7 +1110,7 @@
         <c:majorTickMark val="none"/>
         <c:minorTickMark val="none"/>
         <c:tickLblPos val="nextTo"/>
-        <c:crossAx val="2135298696"/>
+        <c:crossAx val="-2115800776"/>
         <c:crosses val="autoZero"/>
         <c:crossBetween val="between"/>
         <c:majorUnit val="0.2"/>
@@ -1473,11 +1473,11 @@
           <c:showBubbleSize val="0"/>
         </c:dLbls>
         <c:gapWidth val="75"/>
-        <c:axId val="2136194072"/>
-        <c:axId val="2136191000"/>
+        <c:axId val="-2141748376"/>
+        <c:axId val="-2141745320"/>
       </c:barChart>
       <c:catAx>
-        <c:axId val="2136194072"/>
+        <c:axId val="-2141748376"/>
         <c:scaling>
           <c:orientation val="minMax"/>
         </c:scaling>
@@ -1486,7 +1486,7 @@
         <c:majorTickMark val="none"/>
         <c:minorTickMark val="none"/>
         <c:tickLblPos val="nextTo"/>
-        <c:crossAx val="2136191000"/>
+        <c:crossAx val="-2141745320"/>
         <c:crosses val="autoZero"/>
         <c:auto val="1"/>
         <c:lblAlgn val="ctr"/>
@@ -1494,7 +1494,7 @@
         <c:noMultiLvlLbl val="0"/>
       </c:catAx>
       <c:valAx>
-        <c:axId val="2136191000"/>
+        <c:axId val="-2141745320"/>
         <c:scaling>
           <c:orientation val="minMax"/>
           <c:max val="1.0"/>
@@ -1505,7 +1505,7 @@
         <c:majorTickMark val="none"/>
         <c:minorTickMark val="none"/>
         <c:tickLblPos val="nextTo"/>
-        <c:crossAx val="2136194072"/>
+        <c:crossAx val="-2141748376"/>
         <c:crosses val="autoZero"/>
         <c:crossBetween val="between"/>
         <c:majorUnit val="0.2"/>
@@ -1761,7 +1761,7 @@
             <a:fld id="{1B4921DE-03EC-4A59-99EA-C0CA08B6BE68}" type="datetimeFigureOut">
               <a:rPr lang="en-US" smtClean="0"/>
               <a:pPr/>
-              <a:t>11/16/12</a:t>
+              <a:t>1/18/13</a:t>
             </a:fld>
             <a:endParaRPr lang="en-US" dirty="0"/>
           </a:p>
@@ -2825,7 +2825,7 @@
             <a:fld id="{7EFF117B-4E5B-4880-BBC6-6BDA9D3ADD30}" type="datetimeFigureOut">
               <a:rPr lang="en-US" smtClean="0"/>
               <a:pPr/>
-              <a:t>11/16/12</a:t>
+              <a:t>1/18/13</a:t>
             </a:fld>
             <a:endParaRPr lang="en-US" dirty="0"/>
           </a:p>
@@ -2992,7 +2992,7 @@
             <a:fld id="{7EFF117B-4E5B-4880-BBC6-6BDA9D3ADD30}" type="datetimeFigureOut">
               <a:rPr lang="en-US" smtClean="0"/>
               <a:pPr/>
-              <a:t>11/16/12</a:t>
+              <a:t>1/18/13</a:t>
             </a:fld>
             <a:endParaRPr lang="en-US" dirty="0"/>
           </a:p>
@@ -3169,7 +3169,7 @@
             <a:fld id="{7EFF117B-4E5B-4880-BBC6-6BDA9D3ADD30}" type="datetimeFigureOut">
               <a:rPr lang="en-US" smtClean="0"/>
               <a:pPr/>
-              <a:t>11/16/12</a:t>
+              <a:t>1/18/13</a:t>
             </a:fld>
             <a:endParaRPr lang="en-US" dirty="0"/>
           </a:p>
@@ -3336,7 +3336,7 @@
             <a:fld id="{7EFF117B-4E5B-4880-BBC6-6BDA9D3ADD30}" type="datetimeFigureOut">
               <a:rPr lang="en-US" smtClean="0"/>
               <a:pPr/>
-              <a:t>11/16/12</a:t>
+              <a:t>1/18/13</a:t>
             </a:fld>
             <a:endParaRPr lang="en-US" dirty="0"/>
           </a:p>
@@ -3579,7 +3579,7 @@
             <a:fld id="{7EFF117B-4E5B-4880-BBC6-6BDA9D3ADD30}" type="datetimeFigureOut">
               <a:rPr lang="en-US" smtClean="0"/>
               <a:pPr/>
-              <a:t>11/16/12</a:t>
+              <a:t>1/18/13</a:t>
             </a:fld>
             <a:endParaRPr lang="en-US" dirty="0"/>
           </a:p>
@@ -3864,7 +3864,7 @@
             <a:fld id="{7EFF117B-4E5B-4880-BBC6-6BDA9D3ADD30}" type="datetimeFigureOut">
               <a:rPr lang="en-US" smtClean="0"/>
               <a:pPr/>
-              <a:t>11/16/12</a:t>
+              <a:t>1/18/13</a:t>
             </a:fld>
             <a:endParaRPr lang="en-US" dirty="0"/>
           </a:p>
@@ -4283,7 +4283,7 @@
             <a:fld id="{7EFF117B-4E5B-4880-BBC6-6BDA9D3ADD30}" type="datetimeFigureOut">
               <a:rPr lang="en-US" smtClean="0"/>
               <a:pPr/>
-              <a:t>11/16/12</a:t>
+              <a:t>1/18/13</a:t>
             </a:fld>
             <a:endParaRPr lang="en-US" dirty="0"/>
           </a:p>
@@ -4398,7 +4398,7 @@
             <a:fld id="{7EFF117B-4E5B-4880-BBC6-6BDA9D3ADD30}" type="datetimeFigureOut">
               <a:rPr lang="en-US" smtClean="0"/>
               <a:pPr/>
-              <a:t>11/16/12</a:t>
+              <a:t>1/18/13</a:t>
             </a:fld>
             <a:endParaRPr lang="en-US" dirty="0"/>
           </a:p>
@@ -4490,7 +4490,7 @@
             <a:fld id="{7EFF117B-4E5B-4880-BBC6-6BDA9D3ADD30}" type="datetimeFigureOut">
               <a:rPr lang="en-US" smtClean="0"/>
               <a:pPr/>
-              <a:t>11/16/12</a:t>
+              <a:t>1/18/13</a:t>
             </a:fld>
             <a:endParaRPr lang="en-US" dirty="0"/>
           </a:p>
@@ -4764,7 +4764,7 @@
             <a:fld id="{7EFF117B-4E5B-4880-BBC6-6BDA9D3ADD30}" type="datetimeFigureOut">
               <a:rPr lang="en-US" smtClean="0"/>
               <a:pPr/>
-              <a:t>11/16/12</a:t>
+              <a:t>1/18/13</a:t>
             </a:fld>
             <a:endParaRPr lang="en-US" dirty="0"/>
           </a:p>
@@ -5014,7 +5014,7 @@
             <a:fld id="{7EFF117B-4E5B-4880-BBC6-6BDA9D3ADD30}" type="datetimeFigureOut">
               <a:rPr lang="en-US" smtClean="0"/>
               <a:pPr/>
-              <a:t>11/16/12</a:t>
+              <a:t>1/18/13</a:t>
             </a:fld>
             <a:endParaRPr lang="en-US" dirty="0"/>
           </a:p>
@@ -5224,7 +5224,7 @@
             <a:fld id="{7EFF117B-4E5B-4880-BBC6-6BDA9D3ADD30}" type="datetimeFigureOut">
               <a:rPr lang="en-US" smtClean="0"/>
               <a:pPr/>
-              <a:t>11/16/12</a:t>
+              <a:t>1/18/13</a:t>
             </a:fld>
             <a:endParaRPr lang="en-US" dirty="0"/>
           </a:p>
@@ -9406,7 +9406,7 @@
           <p:nvPr>
             <p:extLst>
               <p:ext uri="{D42A27DB-BD31-4B8C-83A1-F6EECF244321}">
-                <p14:modId xmlns:p14="http://schemas.microsoft.com/office/powerpoint/2010/main" val="3203556749"/>
+                <p14:modId xmlns:p14="http://schemas.microsoft.com/office/powerpoint/2010/main" val="2688572813"/>
               </p:ext>
             </p:extLst>
           </p:nvPr>
@@ -9719,14 +9719,23 @@
                       <a:pPr algn="ctr"/>
                       <a:r>
                         <a:rPr lang="en-US" dirty="0" smtClean="0"/>
-                        <a:t>79%</a:t>
-                      </a:r>
+                        <a:t>78%</a:t>
+                      </a:r>
+                      <a:endParaRPr lang="en-US" dirty="0" smtClean="0"/>
                     </a:p>
                     <a:p>
                       <a:pPr algn="ctr"/>
                       <a:r>
                         <a:rPr lang="en-US" dirty="0" smtClean="0"/>
-                        <a:t>(46/58)</a:t>
+                        <a:t>(</a:t>
+                      </a:r>
+                      <a:r>
+                        <a:rPr lang="en-US" dirty="0" smtClean="0"/>
+                        <a:t>45/</a:t>
+                      </a:r>
+                      <a:r>
+                        <a:rPr lang="en-US" dirty="0" smtClean="0"/>
+                        <a:t>58)</a:t>
                       </a:r>
                       <a:endParaRPr lang="en-US" dirty="0"/>
                     </a:p>
@@ -9741,14 +9750,23 @@
                       <a:pPr algn="ctr"/>
                       <a:r>
                         <a:rPr lang="en-US" dirty="0" smtClean="0"/>
-                        <a:t>84%</a:t>
-                      </a:r>
+                        <a:t>83%</a:t>
+                      </a:r>
+                      <a:endParaRPr lang="en-US" dirty="0" smtClean="0"/>
                     </a:p>
                     <a:p>
                       <a:pPr algn="ctr"/>
                       <a:r>
                         <a:rPr lang="en-US" dirty="0" smtClean="0"/>
-                        <a:t>(92/109)</a:t>
+                        <a:t>(</a:t>
+                      </a:r>
+                      <a:r>
+                        <a:rPr lang="en-US" dirty="0" smtClean="0"/>
+                        <a:t>91/</a:t>
+                      </a:r>
+                      <a:r>
+                        <a:rPr lang="en-US" dirty="0" smtClean="0"/>
+                        <a:t>109)</a:t>
                       </a:r>
                       <a:endParaRPr lang="en-US" dirty="0"/>
                     </a:p>

</xml_diff>

<commit_message>
Updated Weekly Attendence and Board Dashboard
</commit_message>
<xml_diff>
--- a/Dashboards/KIPP Chicago Dashboard Charts 121115.pptx
+++ b/Dashboards/KIPP Chicago Dashboard Charts 121115.pptx
@@ -406,11 +406,11 @@
         </c:dLbls>
         <c:gapWidth val="150"/>
         <c:overlap val="100"/>
-        <c:axId val="2078743928"/>
-        <c:axId val="2078746840"/>
+        <c:axId val="2137224152"/>
+        <c:axId val="2137227064"/>
       </c:barChart>
       <c:catAx>
-        <c:axId val="2078743928"/>
+        <c:axId val="2137224152"/>
         <c:scaling>
           <c:orientation val="minMax"/>
         </c:scaling>
@@ -419,7 +419,7 @@
         <c:majorTickMark val="out"/>
         <c:minorTickMark val="none"/>
         <c:tickLblPos val="nextTo"/>
-        <c:crossAx val="2078746840"/>
+        <c:crossAx val="2137227064"/>
         <c:crosses val="autoZero"/>
         <c:auto val="1"/>
         <c:lblAlgn val="ctr"/>
@@ -427,7 +427,7 @@
         <c:noMultiLvlLbl val="0"/>
       </c:catAx>
       <c:valAx>
-        <c:axId val="2078746840"/>
+        <c:axId val="2137227064"/>
         <c:scaling>
           <c:orientation val="minMax"/>
         </c:scaling>
@@ -438,7 +438,7 @@
         <c:majorTickMark val="out"/>
         <c:minorTickMark val="none"/>
         <c:tickLblPos val="nextTo"/>
-        <c:crossAx val="2078743928"/>
+        <c:crossAx val="2137224152"/>
         <c:crosses val="autoZero"/>
         <c:crossBetween val="between"/>
       </c:valAx>
@@ -587,11 +587,11 @@
         </c:dLbls>
         <c:marker val="1"/>
         <c:smooth val="0"/>
-        <c:axId val="-2114504824"/>
-        <c:axId val="-2114490920"/>
+        <c:axId val="2134810344"/>
+        <c:axId val="2134813288"/>
       </c:lineChart>
       <c:catAx>
-        <c:axId val="-2114504824"/>
+        <c:axId val="2134810344"/>
         <c:scaling>
           <c:orientation val="minMax"/>
         </c:scaling>
@@ -600,7 +600,7 @@
         <c:majorTickMark val="out"/>
         <c:minorTickMark val="none"/>
         <c:tickLblPos val="nextTo"/>
-        <c:crossAx val="-2114490920"/>
+        <c:crossAx val="2134813288"/>
         <c:crosses val="autoZero"/>
         <c:auto val="1"/>
         <c:lblAlgn val="ctr"/>
@@ -608,7 +608,7 @@
         <c:noMultiLvlLbl val="0"/>
       </c:catAx>
       <c:valAx>
-        <c:axId val="-2114490920"/>
+        <c:axId val="2134813288"/>
         <c:scaling>
           <c:orientation val="minMax"/>
         </c:scaling>
@@ -619,7 +619,7 @@
         <c:majorTickMark val="out"/>
         <c:minorTickMark val="none"/>
         <c:tickLblPos val="nextTo"/>
-        <c:crossAx val="-2114504824"/>
+        <c:crossAx val="2134810344"/>
         <c:crosses val="autoZero"/>
         <c:crossBetween val="between"/>
         <c:majorUnit val="400000.0"/>
@@ -832,11 +832,11 @@
           <c:showBubbleSize val="0"/>
         </c:dLbls>
         <c:gapWidth val="75"/>
-        <c:axId val="-2114384408"/>
-        <c:axId val="-2114403016"/>
+        <c:axId val="2134781608"/>
+        <c:axId val="2134791128"/>
       </c:barChart>
       <c:catAx>
-        <c:axId val="-2114384408"/>
+        <c:axId val="2134781608"/>
         <c:scaling>
           <c:orientation val="minMax"/>
         </c:scaling>
@@ -845,7 +845,7 @@
         <c:majorTickMark val="none"/>
         <c:minorTickMark val="none"/>
         <c:tickLblPos val="nextTo"/>
-        <c:crossAx val="-2114403016"/>
+        <c:crossAx val="2134791128"/>
         <c:crosses val="autoZero"/>
         <c:auto val="1"/>
         <c:lblAlgn val="ctr"/>
@@ -853,7 +853,7 @@
         <c:noMultiLvlLbl val="0"/>
       </c:catAx>
       <c:valAx>
-        <c:axId val="-2114403016"/>
+        <c:axId val="2134791128"/>
         <c:scaling>
           <c:orientation val="minMax"/>
           <c:max val="1.0"/>
@@ -864,7 +864,7 @@
         <c:majorTickMark val="none"/>
         <c:minorTickMark val="none"/>
         <c:tickLblPos val="nextTo"/>
-        <c:crossAx val="-2114384408"/>
+        <c:crossAx val="2134781608"/>
         <c:crosses val="autoZero"/>
         <c:crossBetween val="between"/>
         <c:majorUnit val="0.2"/>
@@ -1078,11 +1078,11 @@
           <c:showBubbleSize val="0"/>
         </c:dLbls>
         <c:gapWidth val="75"/>
-        <c:axId val="-2115800776"/>
-        <c:axId val="-2115791256"/>
+        <c:axId val="2132540344"/>
+        <c:axId val="2132622232"/>
       </c:barChart>
       <c:catAx>
-        <c:axId val="-2115800776"/>
+        <c:axId val="2132540344"/>
         <c:scaling>
           <c:orientation val="minMax"/>
         </c:scaling>
@@ -1091,7 +1091,7 @@
         <c:majorTickMark val="none"/>
         <c:minorTickMark val="none"/>
         <c:tickLblPos val="nextTo"/>
-        <c:crossAx val="-2115791256"/>
+        <c:crossAx val="2132622232"/>
         <c:crosses val="autoZero"/>
         <c:auto val="1"/>
         <c:lblAlgn val="ctr"/>
@@ -1099,7 +1099,7 @@
         <c:noMultiLvlLbl val="0"/>
       </c:catAx>
       <c:valAx>
-        <c:axId val="-2115791256"/>
+        <c:axId val="2132622232"/>
         <c:scaling>
           <c:orientation val="minMax"/>
           <c:max val="1.0"/>
@@ -1110,7 +1110,7 @@
         <c:majorTickMark val="none"/>
         <c:minorTickMark val="none"/>
         <c:tickLblPos val="nextTo"/>
-        <c:crossAx val="-2115800776"/>
+        <c:crossAx val="2132540344"/>
         <c:crosses val="autoZero"/>
         <c:crossBetween val="between"/>
         <c:majorUnit val="0.2"/>
@@ -1473,11 +1473,11 @@
           <c:showBubbleSize val="0"/>
         </c:dLbls>
         <c:gapWidth val="75"/>
-        <c:axId val="-2141748376"/>
-        <c:axId val="-2141745320"/>
+        <c:axId val="2132440312"/>
+        <c:axId val="2132629880"/>
       </c:barChart>
       <c:catAx>
-        <c:axId val="-2141748376"/>
+        <c:axId val="2132440312"/>
         <c:scaling>
           <c:orientation val="minMax"/>
         </c:scaling>
@@ -1486,7 +1486,7 @@
         <c:majorTickMark val="none"/>
         <c:minorTickMark val="none"/>
         <c:tickLblPos val="nextTo"/>
-        <c:crossAx val="-2141745320"/>
+        <c:crossAx val="2132629880"/>
         <c:crosses val="autoZero"/>
         <c:auto val="1"/>
         <c:lblAlgn val="ctr"/>
@@ -1494,7 +1494,7 @@
         <c:noMultiLvlLbl val="0"/>
       </c:catAx>
       <c:valAx>
-        <c:axId val="-2141745320"/>
+        <c:axId val="2132629880"/>
         <c:scaling>
           <c:orientation val="minMax"/>
           <c:max val="1.0"/>
@@ -1505,7 +1505,7 @@
         <c:majorTickMark val="none"/>
         <c:minorTickMark val="none"/>
         <c:tickLblPos val="nextTo"/>
-        <c:crossAx val="-2141748376"/>
+        <c:crossAx val="2132440312"/>
         <c:crosses val="autoZero"/>
         <c:crossBetween val="between"/>
         <c:majorUnit val="0.2"/>
@@ -1761,7 +1761,7 @@
             <a:fld id="{1B4921DE-03EC-4A59-99EA-C0CA08B6BE68}" type="datetimeFigureOut">
               <a:rPr lang="en-US" smtClean="0"/>
               <a:pPr/>
-              <a:t>1/18/13</a:t>
+              <a:t>3/4/13</a:t>
             </a:fld>
             <a:endParaRPr lang="en-US" dirty="0"/>
           </a:p>
@@ -2825,7 +2825,7 @@
             <a:fld id="{7EFF117B-4E5B-4880-BBC6-6BDA9D3ADD30}" type="datetimeFigureOut">
               <a:rPr lang="en-US" smtClean="0"/>
               <a:pPr/>
-              <a:t>1/18/13</a:t>
+              <a:t>3/4/13</a:t>
             </a:fld>
             <a:endParaRPr lang="en-US" dirty="0"/>
           </a:p>
@@ -2992,7 +2992,7 @@
             <a:fld id="{7EFF117B-4E5B-4880-BBC6-6BDA9D3ADD30}" type="datetimeFigureOut">
               <a:rPr lang="en-US" smtClean="0"/>
               <a:pPr/>
-              <a:t>1/18/13</a:t>
+              <a:t>3/4/13</a:t>
             </a:fld>
             <a:endParaRPr lang="en-US" dirty="0"/>
           </a:p>
@@ -3169,7 +3169,7 @@
             <a:fld id="{7EFF117B-4E5B-4880-BBC6-6BDA9D3ADD30}" type="datetimeFigureOut">
               <a:rPr lang="en-US" smtClean="0"/>
               <a:pPr/>
-              <a:t>1/18/13</a:t>
+              <a:t>3/4/13</a:t>
             </a:fld>
             <a:endParaRPr lang="en-US" dirty="0"/>
           </a:p>
@@ -3336,7 +3336,7 @@
             <a:fld id="{7EFF117B-4E5B-4880-BBC6-6BDA9D3ADD30}" type="datetimeFigureOut">
               <a:rPr lang="en-US" smtClean="0"/>
               <a:pPr/>
-              <a:t>1/18/13</a:t>
+              <a:t>3/4/13</a:t>
             </a:fld>
             <a:endParaRPr lang="en-US" dirty="0"/>
           </a:p>
@@ -3579,7 +3579,7 @@
             <a:fld id="{7EFF117B-4E5B-4880-BBC6-6BDA9D3ADD30}" type="datetimeFigureOut">
               <a:rPr lang="en-US" smtClean="0"/>
               <a:pPr/>
-              <a:t>1/18/13</a:t>
+              <a:t>3/4/13</a:t>
             </a:fld>
             <a:endParaRPr lang="en-US" dirty="0"/>
           </a:p>
@@ -3864,7 +3864,7 @@
             <a:fld id="{7EFF117B-4E5B-4880-BBC6-6BDA9D3ADD30}" type="datetimeFigureOut">
               <a:rPr lang="en-US" smtClean="0"/>
               <a:pPr/>
-              <a:t>1/18/13</a:t>
+              <a:t>3/4/13</a:t>
             </a:fld>
             <a:endParaRPr lang="en-US" dirty="0"/>
           </a:p>
@@ -4283,7 +4283,7 @@
             <a:fld id="{7EFF117B-4E5B-4880-BBC6-6BDA9D3ADD30}" type="datetimeFigureOut">
               <a:rPr lang="en-US" smtClean="0"/>
               <a:pPr/>
-              <a:t>1/18/13</a:t>
+              <a:t>3/4/13</a:t>
             </a:fld>
             <a:endParaRPr lang="en-US" dirty="0"/>
           </a:p>
@@ -4398,7 +4398,7 @@
             <a:fld id="{7EFF117B-4E5B-4880-BBC6-6BDA9D3ADD30}" type="datetimeFigureOut">
               <a:rPr lang="en-US" smtClean="0"/>
               <a:pPr/>
-              <a:t>1/18/13</a:t>
+              <a:t>3/4/13</a:t>
             </a:fld>
             <a:endParaRPr lang="en-US" dirty="0"/>
           </a:p>
@@ -4490,7 +4490,7 @@
             <a:fld id="{7EFF117B-4E5B-4880-BBC6-6BDA9D3ADD30}" type="datetimeFigureOut">
               <a:rPr lang="en-US" smtClean="0"/>
               <a:pPr/>
-              <a:t>1/18/13</a:t>
+              <a:t>3/4/13</a:t>
             </a:fld>
             <a:endParaRPr lang="en-US" dirty="0"/>
           </a:p>
@@ -4764,7 +4764,7 @@
             <a:fld id="{7EFF117B-4E5B-4880-BBC6-6BDA9D3ADD30}" type="datetimeFigureOut">
               <a:rPr lang="en-US" smtClean="0"/>
               <a:pPr/>
-              <a:t>1/18/13</a:t>
+              <a:t>3/4/13</a:t>
             </a:fld>
             <a:endParaRPr lang="en-US" dirty="0"/>
           </a:p>
@@ -5014,7 +5014,7 @@
             <a:fld id="{7EFF117B-4E5B-4880-BBC6-6BDA9D3ADD30}" type="datetimeFigureOut">
               <a:rPr lang="en-US" smtClean="0"/>
               <a:pPr/>
-              <a:t>1/18/13</a:t>
+              <a:t>3/4/13</a:t>
             </a:fld>
             <a:endParaRPr lang="en-US" dirty="0"/>
           </a:p>
@@ -5224,7 +5224,7 @@
             <a:fld id="{7EFF117B-4E5B-4880-BBC6-6BDA9D3ADD30}" type="datetimeFigureOut">
               <a:rPr lang="en-US" smtClean="0"/>
               <a:pPr/>
-              <a:t>1/18/13</a:t>
+              <a:t>3/4/13</a:t>
             </a:fld>
             <a:endParaRPr lang="en-US" dirty="0"/>
           </a:p>
@@ -9406,7 +9406,7 @@
           <p:nvPr>
             <p:extLst>
               <p:ext uri="{D42A27DB-BD31-4B8C-83A1-F6EECF244321}">
-                <p14:modId xmlns:p14="http://schemas.microsoft.com/office/powerpoint/2010/main" val="2688572813"/>
+                <p14:modId xmlns:p14="http://schemas.microsoft.com/office/powerpoint/2010/main" val="1666522886"/>
               </p:ext>
             </p:extLst>
           </p:nvPr>
@@ -9538,14 +9538,23 @@
                       <a:pPr algn="ctr"/>
                       <a:r>
                         <a:rPr lang="en-US" dirty="0" smtClean="0"/>
-                        <a:t>88%</a:t>
-                      </a:r>
+                        <a:t>86%</a:t>
+                      </a:r>
+                      <a:endParaRPr lang="en-US" dirty="0" smtClean="0"/>
                     </a:p>
                     <a:p>
                       <a:pPr algn="ctr"/>
                       <a:r>
                         <a:rPr lang="en-US" dirty="0" smtClean="0"/>
-                        <a:t>(51/58)</a:t>
+                        <a:t>(</a:t>
+                      </a:r>
+                      <a:r>
+                        <a:rPr lang="en-US" dirty="0" smtClean="0"/>
+                        <a:t>50/</a:t>
+                      </a:r>
+                      <a:r>
+                        <a:rPr lang="en-US" dirty="0" smtClean="0"/>
+                        <a:t>58)</a:t>
                       </a:r>
                       <a:endParaRPr lang="en-US" dirty="0"/>
                     </a:p>
@@ -9560,14 +9569,19 @@
                       <a:pPr algn="ctr"/>
                       <a:r>
                         <a:rPr lang="en-US" dirty="0" smtClean="0"/>
-                        <a:t>92%</a:t>
-                      </a:r>
+                        <a:t>91%</a:t>
+                      </a:r>
+                      <a:endParaRPr lang="en-US" dirty="0" smtClean="0"/>
                     </a:p>
                     <a:p>
                       <a:pPr algn="ctr"/>
                       <a:r>
                         <a:rPr lang="en-US" dirty="0" smtClean="0"/>
-                        <a:t>(100/109)</a:t>
+                        <a:t>(99/</a:t>
+                      </a:r>
+                      <a:r>
+                        <a:rPr lang="en-US" dirty="0" smtClean="0"/>
+                        <a:t>109)</a:t>
                       </a:r>
                     </a:p>
                   </a:txBody>
@@ -9602,14 +9616,23 @@
                       <a:pPr algn="ctr"/>
                       <a:r>
                         <a:rPr lang="en-US" dirty="0" smtClean="0"/>
-                        <a:t>94%</a:t>
-                      </a:r>
+                        <a:t>88%</a:t>
+                      </a:r>
+                      <a:endParaRPr lang="en-US" dirty="0" smtClean="0"/>
                     </a:p>
                     <a:p>
                       <a:pPr algn="ctr"/>
                       <a:r>
                         <a:rPr lang="en-US" dirty="0" smtClean="0"/>
-                        <a:t>(48/51)</a:t>
+                        <a:t>(</a:t>
+                      </a:r>
+                      <a:r>
+                        <a:rPr lang="en-US" dirty="0" smtClean="0"/>
+                        <a:t>45/</a:t>
+                      </a:r>
+                      <a:r>
+                        <a:rPr lang="en-US" dirty="0" smtClean="0"/>
+                        <a:t>51)</a:t>
                       </a:r>
                       <a:endParaRPr lang="en-US" dirty="0"/>
                     </a:p>
@@ -9624,14 +9647,23 @@
                       <a:pPr algn="ctr"/>
                       <a:r>
                         <a:rPr lang="en-US" dirty="0" smtClean="0"/>
-                        <a:t>81%</a:t>
-                      </a:r>
+                        <a:t>76%</a:t>
+                      </a:r>
+                      <a:endParaRPr lang="en-US" dirty="0" smtClean="0"/>
                     </a:p>
                     <a:p>
                       <a:pPr algn="ctr"/>
                       <a:r>
                         <a:rPr lang="en-US" dirty="0" smtClean="0"/>
-                        <a:t>(47/58)</a:t>
+                        <a:t>(</a:t>
+                      </a:r>
+                      <a:r>
+                        <a:rPr lang="en-US" dirty="0" smtClean="0"/>
+                        <a:t>45/</a:t>
+                      </a:r>
+                      <a:r>
+                        <a:rPr lang="en-US" dirty="0" smtClean="0"/>
+                        <a:t>58)</a:t>
                       </a:r>
                       <a:endParaRPr lang="en-US" dirty="0"/>
                     </a:p>
@@ -9646,8 +9678,9 @@
                       <a:pPr algn="ctr"/>
                       <a:r>
                         <a:rPr lang="en-US" dirty="0" smtClean="0"/>
-                        <a:t>87%</a:t>
-                      </a:r>
+                        <a:t>83%</a:t>
+                      </a:r>
+                      <a:endParaRPr lang="en-US" dirty="0" smtClean="0"/>
                     </a:p>
                     <a:p>
                       <a:pPr algn="ctr"/>
@@ -9697,14 +9730,23 @@
                       <a:pPr algn="ctr"/>
                       <a:r>
                         <a:rPr lang="en-US" dirty="0" smtClean="0"/>
-                        <a:t>90%</a:t>
-                      </a:r>
+                        <a:t>86%</a:t>
+                      </a:r>
+                      <a:endParaRPr lang="en-US" dirty="0" smtClean="0"/>
                     </a:p>
                     <a:p>
                       <a:pPr algn="ctr"/>
                       <a:r>
                         <a:rPr lang="en-US" dirty="0" smtClean="0"/>
-                        <a:t>(46/51)</a:t>
+                        <a:t>(</a:t>
+                      </a:r>
+                      <a:r>
+                        <a:rPr lang="en-US" dirty="0" smtClean="0"/>
+                        <a:t>44/</a:t>
+                      </a:r>
+                      <a:r>
+                        <a:rPr lang="en-US" dirty="0" smtClean="0"/>
+                        <a:t>51)</a:t>
                       </a:r>
                       <a:endParaRPr lang="en-US" dirty="0"/>
                     </a:p>
@@ -9719,7 +9761,7 @@
                       <a:pPr algn="ctr"/>
                       <a:r>
                         <a:rPr lang="en-US" dirty="0" smtClean="0"/>
-                        <a:t>78%</a:t>
+                        <a:t>76%</a:t>
                       </a:r>
                       <a:endParaRPr lang="en-US" dirty="0" smtClean="0"/>
                     </a:p>
@@ -9731,7 +9773,7 @@
                       </a:r>
                       <a:r>
                         <a:rPr lang="en-US" dirty="0" smtClean="0"/>
-                        <a:t>45/</a:t>
+                        <a:t>44/</a:t>
                       </a:r>
                       <a:r>
                         <a:rPr lang="en-US" dirty="0" smtClean="0"/>
@@ -9750,7 +9792,7 @@
                       <a:pPr algn="ctr"/>
                       <a:r>
                         <a:rPr lang="en-US" dirty="0" smtClean="0"/>
-                        <a:t>83%</a:t>
+                        <a:t>81%</a:t>
                       </a:r>
                       <a:endParaRPr lang="en-US" dirty="0" smtClean="0"/>
                     </a:p>
@@ -9758,11 +9800,7 @@
                       <a:pPr algn="ctr"/>
                       <a:r>
                         <a:rPr lang="en-US" dirty="0" smtClean="0"/>
-                        <a:t>(</a:t>
-                      </a:r>
-                      <a:r>
-                        <a:rPr lang="en-US" dirty="0" smtClean="0"/>
-                        <a:t>91/</a:t>
+                        <a:t>(88/</a:t>
                       </a:r>
                       <a:r>
                         <a:rPr lang="en-US" dirty="0" smtClean="0"/>

</xml_diff>